<commit_message>
Change required goals title to make the list item wording flow better
</commit_message>
<xml_diff>
--- a/Proposal/Proposal.pptx
+++ b/Proposal/Proposal.pptx
@@ -3390,8 +3390,12 @@
           <a:lstStyle/>
           <a:p>
             <a:r>
+              <a:rPr lang="en-US" dirty="0" err="1" smtClean="0"/>
+              <a:t>KennySync</a:t>
+            </a:r>
+            <a:r>
               <a:rPr lang="en-US" dirty="0" smtClean="0"/>
-              <a:t>Project Goals</a:t>
+              <a:t> Must:</a:t>
             </a:r>
             <a:endParaRPr lang="en-US" dirty="0"/>
           </a:p>

</xml_diff>

<commit_message>
Update PPT per Will's email
Signed-off-by: Tim Ekl <lithium3141@gmail.com>
</commit_message>
<xml_diff>
--- a/Proposal/Proposal.pptx
+++ b/Proposal/Proposal.pptx
@@ -11,7 +11,8 @@
     <p:sldId id="258" r:id="rId5"/>
     <p:sldId id="262" r:id="rId6"/>
     <p:sldId id="261" r:id="rId7"/>
-    <p:sldId id="260" r:id="rId8"/>
+    <p:sldId id="263" r:id="rId8"/>
+    <p:sldId id="260" r:id="rId9"/>
   </p:sldIdLst>
   <p:sldSz cx="9144000" cy="6858000" type="screen4x3"/>
   <p:notesSz cx="6858000" cy="9144000"/>
@@ -3390,12 +3391,8 @@
           <a:lstStyle/>
           <a:p>
             <a:r>
-              <a:rPr lang="en-US" dirty="0" err="1" smtClean="0"/>
-              <a:t>KennySync</a:t>
-            </a:r>
-            <a:r>
-              <a:rPr lang="en-US" dirty="0" smtClean="0"/>
-              <a:t> Must:</a:t>
+              <a:rPr lang="en-US" dirty="0" smtClean="0"/>
+              <a:t>Mandatory Goals</a:t>
             </a:r>
             <a:endParaRPr lang="en-US" dirty="0"/>
           </a:p>
@@ -3643,34 +3640,34 @@
           <a:p>
             <a:r>
               <a:rPr lang="en-US" dirty="0" smtClean="0"/>
-              <a:t>Eric – </a:t>
-            </a:r>
-          </a:p>
-          <a:p>
-            <a:endParaRPr lang="en-US" dirty="0" smtClean="0"/>
-          </a:p>
-          <a:p>
-            <a:r>
-              <a:rPr lang="en-US" dirty="0" smtClean="0"/>
-              <a:t>Will </a:t>
-            </a:r>
-            <a:r>
-              <a:rPr lang="en-US" dirty="0"/>
-              <a:t>– </a:t>
-            </a:r>
-          </a:p>
-          <a:p>
-            <a:endParaRPr lang="en-US" dirty="0" smtClean="0"/>
-          </a:p>
-          <a:p>
-            <a:r>
-              <a:rPr lang="en-US" dirty="0" smtClean="0"/>
-              <a:t>Tim </a:t>
-            </a:r>
-            <a:r>
-              <a:rPr lang="en-US" dirty="0"/>
-              <a:t>– </a:t>
-            </a:r>
+              <a:t>Minimal</a:t>
+            </a:r>
+          </a:p>
+          <a:p>
+            <a:r>
+              <a:rPr lang="en-US" dirty="0" smtClean="0"/>
+              <a:t>Highly ad-hoc: team works in one- or two-week sprints, completing significant features each week</a:t>
+            </a:r>
+          </a:p>
+          <a:p>
+            <a:r>
+              <a:rPr lang="en-US" dirty="0" smtClean="0"/>
+              <a:t>Using Ruby 1.9; Tim may serve as domain expert in language</a:t>
+            </a:r>
+          </a:p>
+          <a:p>
+            <a:r>
+              <a:rPr lang="en-US" dirty="0" smtClean="0"/>
+              <a:t>Features, requirements, &amp; planning decided by consensus</a:t>
+            </a:r>
+          </a:p>
+          <a:p>
+            <a:pPr lvl="1"/>
+            <a:r>
+              <a:rPr lang="en-US" dirty="0" smtClean="0"/>
+              <a:t>Team of 3 is small enough to make this work</a:t>
+            </a:r>
+            <a:endParaRPr lang="en-US" dirty="0"/>
           </a:p>
           <a:p>
             <a:endParaRPr lang="en-US" dirty="0"/>
@@ -3747,34 +3744,110 @@
           <a:p>
             <a:r>
               <a:rPr lang="en-US" dirty="0" smtClean="0"/>
-              <a:t>Week 5 Day 4 – Milestone 2 (Literature review and design)</a:t>
-            </a:r>
-          </a:p>
-          <a:p>
+              <a:t>Week 5 Day 4 – Milestone 2 </a:t>
+            </a:r>
+            <a:r>
+              <a:rPr lang="en-US" dirty="0" smtClean="0"/>
+              <a:t>due (</a:t>
+            </a:r>
+            <a:r>
+              <a:rPr lang="en-US" dirty="0" smtClean="0"/>
+              <a:t>Literature review and design</a:t>
+            </a:r>
+            <a:r>
+              <a:rPr lang="en-US" dirty="0" smtClean="0"/>
+              <a:t>)</a:t>
+            </a:r>
+          </a:p>
+          <a:p>
+            <a:pPr lvl="1"/>
+            <a:r>
+              <a:rPr lang="en-US" dirty="0" smtClean="0"/>
+              <a:t>Team will have read and understand algorithm, variations</a:t>
+            </a:r>
             <a:endParaRPr lang="en-US" dirty="0" smtClean="0"/>
           </a:p>
           <a:p>
             <a:r>
               <a:rPr lang="en-US" dirty="0" smtClean="0"/>
-              <a:t>Week X Day X – </a:t>
-            </a:r>
-          </a:p>
-          <a:p>
+              <a:t>Week </a:t>
+            </a:r>
+            <a:r>
+              <a:rPr lang="en-US" dirty="0" smtClean="0"/>
+              <a:t>6 </a:t>
+            </a:r>
+            <a:r>
+              <a:rPr lang="en-US" dirty="0" smtClean="0"/>
+              <a:t>Day </a:t>
+            </a:r>
+            <a:r>
+              <a:rPr lang="en-US" dirty="0" smtClean="0"/>
+              <a:t>4 </a:t>
+            </a:r>
+            <a:r>
+              <a:rPr lang="en-US" dirty="0" smtClean="0"/>
+              <a:t>– </a:t>
+            </a:r>
+            <a:r>
+              <a:rPr lang="en-US" dirty="0" smtClean="0"/>
+              <a:t>Have connected Ruby nodes</a:t>
+            </a:r>
             <a:endParaRPr lang="en-US" dirty="0" smtClean="0"/>
           </a:p>
           <a:p>
             <a:r>
               <a:rPr lang="en-US" dirty="0" smtClean="0"/>
-              <a:t>Week X Day X – </a:t>
-            </a:r>
-          </a:p>
-          <a:p>
+              <a:t>Week </a:t>
+            </a:r>
+            <a:r>
+              <a:rPr lang="en-US" dirty="0"/>
+              <a:t>8</a:t>
+            </a:r>
+            <a:r>
+              <a:rPr lang="en-US" dirty="0" smtClean="0"/>
+              <a:t> </a:t>
+            </a:r>
+            <a:r>
+              <a:rPr lang="en-US" dirty="0" smtClean="0"/>
+              <a:t>Day </a:t>
+            </a:r>
+            <a:r>
+              <a:rPr lang="en-US" dirty="0" smtClean="0"/>
+              <a:t>4 </a:t>
+            </a:r>
+            <a:r>
+              <a:rPr lang="en-US" dirty="0" smtClean="0"/>
+              <a:t>– </a:t>
+            </a:r>
+            <a:r>
+              <a:rPr lang="en-US" dirty="0" smtClean="0"/>
+              <a:t>Have majority of algorithm implemented</a:t>
+            </a:r>
             <a:endParaRPr lang="en-US" dirty="0"/>
           </a:p>
           <a:p>
             <a:r>
               <a:rPr lang="en-US" dirty="0" smtClean="0"/>
-              <a:t>Week 10 Day 4 – Milestone 3 (Project delivery, Demo, Report, Presentation)</a:t>
+              <a:t>Week 10 Day 4 – Milestone </a:t>
+            </a:r>
+            <a:r>
+              <a:rPr lang="en-US" dirty="0" smtClean="0"/>
+              <a:t>3 due </a:t>
+            </a:r>
+            <a:r>
+              <a:rPr lang="en-US" dirty="0" smtClean="0"/>
+              <a:t>(Project delivery, Demo, Report, Presentation</a:t>
+            </a:r>
+            <a:r>
+              <a:rPr lang="en-US" dirty="0" smtClean="0"/>
+              <a:t>)</a:t>
+            </a:r>
+          </a:p>
+          <a:p>
+            <a:pPr lvl="1"/>
+            <a:r>
+              <a:rPr lang="en-US" dirty="0" smtClean="0"/>
+              <a:t>Team will have implemented visualization for demo to class</a:t>
             </a:r>
             <a:endParaRPr lang="en-US" dirty="0"/>
           </a:p>
@@ -3827,6 +3900,147 @@
           <a:p>
             <a:r>
               <a:rPr lang="en-US" dirty="0" smtClean="0"/>
+              <a:t>Background literature</a:t>
+            </a:r>
+            <a:endParaRPr lang="en-US" dirty="0"/>
+          </a:p>
+        </p:txBody>
+      </p:sp>
+      <p:sp>
+        <p:nvSpPr>
+          <p:cNvPr id="3" name="Content Placeholder 2"/>
+          <p:cNvSpPr>
+            <a:spLocks noGrp="1"/>
+          </p:cNvSpPr>
+          <p:nvPr>
+            <p:ph idx="1"/>
+          </p:nvPr>
+        </p:nvSpPr>
+        <p:spPr/>
+        <p:txBody>
+          <a:bodyPr/>
+          <a:lstStyle/>
+          <a:p>
+            <a:r>
+              <a:rPr lang="en-US" dirty="0" smtClean="0"/>
+              <a:t>Leslie </a:t>
+            </a:r>
+            <a:r>
+              <a:rPr lang="en-US" dirty="0" err="1" smtClean="0"/>
+              <a:t>Lamport</a:t>
+            </a:r>
+            <a:r>
+              <a:rPr lang="en-US" dirty="0" smtClean="0"/>
+              <a:t> wrote it all</a:t>
+            </a:r>
+          </a:p>
+          <a:p>
+            <a:pPr lvl="1"/>
+            <a:r>
+              <a:rPr lang="en-US" dirty="0" smtClean="0"/>
+              <a:t>First description of </a:t>
+            </a:r>
+            <a:r>
+              <a:rPr lang="en-US" dirty="0" err="1" smtClean="0"/>
+              <a:t>Paxos</a:t>
+            </a:r>
+            <a:r>
+              <a:rPr lang="en-US" dirty="0" smtClean="0"/>
+              <a:t>, couched in Greek governance terms</a:t>
+            </a:r>
+          </a:p>
+          <a:p>
+            <a:pPr lvl="1"/>
+            <a:r>
+              <a:rPr lang="en-US" dirty="0" smtClean="0"/>
+              <a:t>“Simple” </a:t>
+            </a:r>
+            <a:r>
+              <a:rPr lang="en-US" dirty="0" err="1" smtClean="0"/>
+              <a:t>Paxos</a:t>
+            </a:r>
+            <a:r>
+              <a:rPr lang="en-US" dirty="0" smtClean="0"/>
+              <a:t> description followed as brief (13-page) note</a:t>
+            </a:r>
+          </a:p>
+          <a:p>
+            <a:pPr lvl="1"/>
+            <a:r>
+              <a:rPr lang="en-US" dirty="0" smtClean="0"/>
+              <a:t>Three other variations:</a:t>
+            </a:r>
+          </a:p>
+          <a:p>
+            <a:pPr lvl="2"/>
+            <a:r>
+              <a:rPr lang="en-US" dirty="0" smtClean="0"/>
+              <a:t>Cheap</a:t>
+            </a:r>
+          </a:p>
+          <a:p>
+            <a:pPr lvl="2"/>
+            <a:r>
+              <a:rPr lang="en-US" dirty="0" smtClean="0"/>
+              <a:t>Fast</a:t>
+            </a:r>
+          </a:p>
+          <a:p>
+            <a:pPr lvl="2"/>
+            <a:r>
+              <a:rPr lang="en-US" dirty="0" smtClean="0"/>
+              <a:t>Generalized</a:t>
+            </a:r>
+          </a:p>
+        </p:txBody>
+      </p:sp>
+    </p:spTree>
+    <p:extLst>
+      <p:ext uri="{BB962C8B-B14F-4D97-AF65-F5344CB8AC3E}">
+        <p14:creationId xmlns:p14="http://schemas.microsoft.com/office/powerpoint/2010/main" val="2948648222"/>
+      </p:ext>
+    </p:extLst>
+  </p:cSld>
+  <p:clrMapOvr>
+    <a:masterClrMapping/>
+  </p:clrMapOvr>
+</p:sld>
+</file>
+
+<file path=ppt/slides/slide8.xml><?xml version="1.0" encoding="utf-8"?>
+<p:sld xmlns:a="http://schemas.openxmlformats.org/drawingml/2006/main" xmlns:r="http://schemas.openxmlformats.org/officeDocument/2006/relationships" xmlns:p="http://schemas.openxmlformats.org/presentationml/2006/main">
+  <p:cSld>
+    <p:spTree>
+      <p:nvGrpSpPr>
+        <p:cNvPr id="1" name=""/>
+        <p:cNvGrpSpPr/>
+        <p:nvPr/>
+      </p:nvGrpSpPr>
+      <p:grpSpPr>
+        <a:xfrm>
+          <a:off x="0" y="0"/>
+          <a:ext cx="0" cy="0"/>
+          <a:chOff x="0" y="0"/>
+          <a:chExt cx="0" cy="0"/>
+        </a:xfrm>
+      </p:grpSpPr>
+      <p:sp>
+        <p:nvSpPr>
+          <p:cNvPr id="2" name="Title 1"/>
+          <p:cNvSpPr>
+            <a:spLocks noGrp="1"/>
+          </p:cNvSpPr>
+          <p:nvPr>
+            <p:ph type="title"/>
+          </p:nvPr>
+        </p:nvSpPr>
+        <p:spPr/>
+        <p:txBody>
+          <a:bodyPr/>
+          <a:lstStyle/>
+          <a:p>
+            <a:r>
+              <a:rPr lang="en-US" dirty="0" smtClean="0"/>
               <a:t>Questions?</a:t>
             </a:r>
             <a:endParaRPr lang="en-US" dirty="0"/>
@@ -3848,10 +4062,6 @@
           <a:bodyPr/>
           <a:lstStyle/>
           <a:p>
-            <a:r>
-              <a:rPr lang="en-US" dirty="0" smtClean="0"/>
-              <a:t>Papers, papers, papers</a:t>
-            </a:r>
             <a:endParaRPr lang="en-US" dirty="0"/>
           </a:p>
         </p:txBody>

</xml_diff>